<commit_message>
presentation for DEFCON 2016
</commit_message>
<xml_diff>
--- a/Papers_Articles_Presentations/Slide_Presentations/Dayton_2016.pptx
+++ b/Papers_Articles_Presentations/Slide_Presentations/Dayton_2016.pptx
@@ -292,7 +292,7 @@
           <a:p>
             <a:fld id="{D4392D90-B8C4-454B-B8E5-81561A492D2F}" type="datetimeFigureOut">
               <a:rPr lang="en-US" smtClean="0"/>
-              <a:t>5/19/16</a:t>
+              <a:t>8/6/16</a:t>
             </a:fld>
             <a:endParaRPr lang="en-US"/>
           </a:p>
@@ -462,7 +462,7 @@
           <a:p>
             <a:fld id="{D4392D90-B8C4-454B-B8E5-81561A492D2F}" type="datetimeFigureOut">
               <a:rPr lang="en-US" smtClean="0"/>
-              <a:t>5/19/16</a:t>
+              <a:t>8/6/16</a:t>
             </a:fld>
             <a:endParaRPr lang="en-US"/>
           </a:p>
@@ -642,7 +642,7 @@
           <a:p>
             <a:fld id="{D4392D90-B8C4-454B-B8E5-81561A492D2F}" type="datetimeFigureOut">
               <a:rPr lang="en-US" smtClean="0"/>
-              <a:t>5/19/16</a:t>
+              <a:t>8/6/16</a:t>
             </a:fld>
             <a:endParaRPr lang="en-US"/>
           </a:p>
@@ -812,7 +812,7 @@
           <a:p>
             <a:fld id="{D4392D90-B8C4-454B-B8E5-81561A492D2F}" type="datetimeFigureOut">
               <a:rPr lang="en-US" smtClean="0"/>
-              <a:t>5/19/16</a:t>
+              <a:t>8/6/16</a:t>
             </a:fld>
             <a:endParaRPr lang="en-US"/>
           </a:p>
@@ -1058,7 +1058,7 @@
           <a:p>
             <a:fld id="{D4392D90-B8C4-454B-B8E5-81561A492D2F}" type="datetimeFigureOut">
               <a:rPr lang="en-US" smtClean="0"/>
-              <a:t>5/19/16</a:t>
+              <a:t>8/6/16</a:t>
             </a:fld>
             <a:endParaRPr lang="en-US"/>
           </a:p>
@@ -1346,7 +1346,7 @@
           <a:p>
             <a:fld id="{D4392D90-B8C4-454B-B8E5-81561A492D2F}" type="datetimeFigureOut">
               <a:rPr lang="en-US" smtClean="0"/>
-              <a:t>5/19/16</a:t>
+              <a:t>8/6/16</a:t>
             </a:fld>
             <a:endParaRPr lang="en-US"/>
           </a:p>
@@ -1768,7 +1768,7 @@
           <a:p>
             <a:fld id="{D4392D90-B8C4-454B-B8E5-81561A492D2F}" type="datetimeFigureOut">
               <a:rPr lang="en-US" smtClean="0"/>
-              <a:t>5/19/16</a:t>
+              <a:t>8/6/16</a:t>
             </a:fld>
             <a:endParaRPr lang="en-US"/>
           </a:p>
@@ -1886,7 +1886,7 @@
           <a:p>
             <a:fld id="{D4392D90-B8C4-454B-B8E5-81561A492D2F}" type="datetimeFigureOut">
               <a:rPr lang="en-US" smtClean="0"/>
-              <a:t>5/19/16</a:t>
+              <a:t>8/6/16</a:t>
             </a:fld>
             <a:endParaRPr lang="en-US"/>
           </a:p>
@@ -1981,7 +1981,7 @@
           <a:p>
             <a:fld id="{D4392D90-B8C4-454B-B8E5-81561A492D2F}" type="datetimeFigureOut">
               <a:rPr lang="en-US" smtClean="0"/>
-              <a:t>5/19/16</a:t>
+              <a:t>8/6/16</a:t>
             </a:fld>
             <a:endParaRPr lang="en-US"/>
           </a:p>
@@ -2258,7 +2258,7 @@
           <a:p>
             <a:fld id="{D4392D90-B8C4-454B-B8E5-81561A492D2F}" type="datetimeFigureOut">
               <a:rPr lang="en-US" smtClean="0"/>
-              <a:t>5/19/16</a:t>
+              <a:t>8/6/16</a:t>
             </a:fld>
             <a:endParaRPr lang="en-US"/>
           </a:p>
@@ -2511,7 +2511,7 @@
           <a:p>
             <a:fld id="{D4392D90-B8C4-454B-B8E5-81561A492D2F}" type="datetimeFigureOut">
               <a:rPr lang="en-US" smtClean="0"/>
-              <a:t>5/19/16</a:t>
+              <a:t>8/6/16</a:t>
             </a:fld>
             <a:endParaRPr lang="en-US"/>
           </a:p>
@@ -2724,7 +2724,7 @@
           <a:p>
             <a:fld id="{D4392D90-B8C4-454B-B8E5-81561A492D2F}" type="datetimeFigureOut">
               <a:rPr lang="en-US" smtClean="0"/>
-              <a:t>5/19/16</a:t>
+              <a:t>8/6/16</a:t>
             </a:fld>
             <a:endParaRPr lang="en-US"/>
           </a:p>
@@ -3099,6 +3099,36 @@
           <a:chExt cx="0" cy="0"/>
         </a:xfrm>
       </p:grpSpPr>
+      <p:pic>
+        <p:nvPicPr>
+          <p:cNvPr id="4" name="Picture 3" descr="Phase_4_Logo.jpg"/>
+          <p:cNvPicPr>
+            <a:picLocks noChangeAspect="1"/>
+          </p:cNvPicPr>
+          <p:nvPr/>
+        </p:nvPicPr>
+        <p:blipFill>
+          <a:blip r:embed="rId2">
+            <a:extLst>
+              <a:ext uri="{28A0092B-C50C-407E-A947-70E740481C1C}">
+                <a14:useLocalDpi xmlns:a14="http://schemas.microsoft.com/office/drawing/2010/main" val="0"/>
+              </a:ext>
+            </a:extLst>
+          </a:blip>
+          <a:stretch>
+            <a:fillRect/>
+          </a:stretch>
+        </p:blipFill>
+        <p:spPr>
+          <a:xfrm>
+            <a:off x="0" y="0"/>
+            <a:ext cx="4320540" cy="4320540"/>
+          </a:xfrm>
+          <a:prstGeom prst="rect">
+            <a:avLst/>
+          </a:prstGeom>
+        </p:spPr>
+      </p:pic>
       <p:sp>
         <p:nvSpPr>
           <p:cNvPr id="2" name="Title 1"/>
@@ -3109,7 +3139,12 @@
             <p:ph type="ctrTitle"/>
           </p:nvPr>
         </p:nvSpPr>
-        <p:spPr/>
+        <p:spPr>
+          <a:xfrm>
+            <a:off x="4229220" y="653143"/>
+            <a:ext cx="4228979" cy="2947307"/>
+          </a:xfrm>
+        </p:spPr>
         <p:txBody>
           <a:bodyPr>
             <a:noAutofit/>
@@ -3143,7 +3178,11 @@
           <a:p>
             <a:r>
               <a:rPr lang="en-US" sz="6000" dirty="0" smtClean="0"/>
-              <a:t>Who What When Where Why How?</a:t>
+              <a:t>Why What When Who Where How</a:t>
+            </a:r>
+            <a:r>
+              <a:rPr lang="en-US" sz="6000" dirty="0" smtClean="0"/>
+              <a:t>?</a:t>
             </a:r>
             <a:endParaRPr lang="en-US" sz="6000" dirty="0"/>
           </a:p>
@@ -3492,11 +3531,7 @@
           <a:p>
             <a:r>
               <a:rPr lang="en-US" dirty="0" smtClean="0"/>
-              <a:t>Radio Amateurs have a golden opportunity to be at the forefront of science and technology.  Incorporating a science package such as an ionosonde on an Amateur geosynchronous satellite (or other science packages, as well) can increase our visibility as radio amateurs to new levels</a:t>
-            </a:r>
-            <a:r>
-              <a:rPr lang="en-US" dirty="0" smtClean="0"/>
-              <a:t>. </a:t>
+              <a:t>Radio Amateurs have a golden opportunity to be at the forefront of science and technology.  Incorporating a science package such as an ionosonde on an Amateur geosynchronous satellite (or other science packages, as well) can increase our visibility as radio amateurs to new levels. </a:t>
             </a:r>
             <a:endParaRPr lang="en-US" dirty="0"/>
           </a:p>

</xml_diff>